<commit_message>
Update the code base to v2.1.2
</commit_message>
<xml_diff>
--- a/Documentation/Code Documentation/ERTAC Documentation - v2.1.1/Design Documents/ERTAC Implementation - v2.1.1.pptx
+++ b/Documentation/Code Documentation/ERTAC Documentation - v2.1.1/Design Documents/ERTAC Implementation - v2.1.1.pptx
@@ -152,7 +152,7 @@
   </p:defaultTextStyle>
   <p:extLst>
     <p:ext uri="{EFAFB233-063F-42B5-8137-9DF3F51BA10A}">
-      <p15:sldGuideLst xmlns:p15="http://schemas.microsoft.com/office/powerpoint/2012/main">
+      <p15:sldGuideLst xmlns="" xmlns:p15="http://schemas.microsoft.com/office/powerpoint/2012/main">
         <p15:guide id="1" orient="horz" pos="2880">
           <p15:clr>
             <a:srgbClr val="A4A3A4"/>
@@ -166,7 +166,7 @@
       </p15:sldGuideLst>
     </p:ext>
     <p:ext uri="{2D200454-40CA-4A62-9FC3-DE9A4176ACB9}">
-      <p15:notesGuideLst xmlns:p15="http://schemas.microsoft.com/office/powerpoint/2012/main">
+      <p15:notesGuideLst xmlns="" xmlns:p15="http://schemas.microsoft.com/office/powerpoint/2012/main">
         <p15:guide id="1" orient="horz" pos="2928">
           <p15:clr>
             <a:srgbClr val="A4A3A4"/>
@@ -187,15 +187,6 @@
 <p:cmAuthorLst xmlns:a="http://schemas.openxmlformats.org/drawingml/2006/main" xmlns:r="http://schemas.openxmlformats.org/officeDocument/2006/relationships" xmlns:p="http://schemas.openxmlformats.org/presentationml/2006/main">
   <p:cmAuthor id="0" name="Doris McLeod" initials="DAM" lastIdx="8" clrIdx="0"/>
 </p:cmAuthorLst>
-</file>
-
-<file path=ppt/comments/comment1.xml><?xml version="1.0" encoding="utf-8"?>
-<p:cmLst xmlns:a="http://schemas.openxmlformats.org/drawingml/2006/main" xmlns:r="http://schemas.openxmlformats.org/officeDocument/2006/relationships" xmlns:p="http://schemas.openxmlformats.org/presentationml/2006/main">
-  <p:cm authorId="0" dt="2017-07-27T12:47:08.458" idx="3">
-    <p:pos x="280" y="2274"/>
-    <p:text>After thinking about it a bit over an Egg McMuffin (no bacon) and a large diet coke, I guess that this is where the code is having issues regarding the generation of GDUs to address UF limitations.  Box 6 does the hourly and annual check so this is where there is some sort of problemo, I'm guessing.</p:text>
-  </p:cm>
-</p:cmLst>
 </file>
 
 <file path=ppt/handoutMasters/handoutMaster1.xml><?xml version="1.0" encoding="utf-8"?>
@@ -289,7 +280,7 @@
               <a:pPr>
                 <a:defRPr/>
               </a:pPr>
-              <a:t>8/30/2017</a:t>
+              <a:t>4/12/2019</a:t>
             </a:fld>
             <a:endParaRPr lang="en-US"/>
           </a:p>
@@ -9915,8 +9906,12 @@
           <a:lstStyle/>
           <a:p>
             <a:r>
-              <a:rPr lang="en-US" sz="1200"/>
-              <a:t>PS2.07-Run edit checks on the information in the UAF</a:t>
+              <a:rPr lang="en-US" sz="1200" dirty="0" smtClean="0"/>
+              <a:t>PS2.09-Run </a:t>
+            </a:r>
+            <a:r>
+              <a:rPr lang="en-US" sz="1200" dirty="0"/>
+              <a:t>edit checks on the information in the UAF</a:t>
             </a:r>
           </a:p>
         </p:txBody>
@@ -10202,7 +10197,15 @@
           <a:p>
             <a:r>
               <a:rPr lang="en-US" sz="1200" dirty="0"/>
-              <a:t> PS2.06-For new units in the UAF, calculate the hourly proxy generation</a:t>
+              <a:t> </a:t>
+            </a:r>
+            <a:r>
+              <a:rPr lang="en-US" sz="1200" dirty="0" smtClean="0"/>
+              <a:t>PS2.08-For </a:t>
+            </a:r>
+            <a:r>
+              <a:rPr lang="en-US" sz="1200" dirty="0"/>
+              <a:t>new units in the UAF, calculate the hourly proxy generation</a:t>
             </a:r>
           </a:p>
         </p:txBody>
@@ -10244,8 +10247,12 @@
           <a:lstStyle/>
           <a:p>
             <a:r>
+              <a:rPr lang="en-US" sz="1200" dirty="0" smtClean="0"/>
+              <a:t>PS2.11-Output </a:t>
+            </a:r>
+            <a:r>
               <a:rPr lang="en-US" sz="1200" dirty="0"/>
-              <a:t>PS2.09-Output a UAF and hourly proxy listing suitable for import into the algorithm to allow  States to review and update UAF information</a:t>
+              <a:t>a UAF and hourly proxy listing suitable for import into the algorithm to allow  States to review and update UAF information</a:t>
             </a:r>
           </a:p>
         </p:txBody>
@@ -10525,8 +10532,12 @@
           <a:lstStyle/>
           <a:p>
             <a:r>
-              <a:rPr lang="en-US" sz="1200"/>
-              <a:t>PS2.08-Create report on units with  data outliers</a:t>
+              <a:rPr lang="en-US" sz="1200" dirty="0" smtClean="0"/>
+              <a:t>PS2.10-Create </a:t>
+            </a:r>
+            <a:r>
+              <a:rPr lang="en-US" sz="1200" dirty="0"/>
+              <a:t>report on units with  data outliers</a:t>
             </a:r>
           </a:p>
         </p:txBody>
@@ -11092,13 +11103,13 @@
           <a:lstStyle/>
           <a:p>
             <a:r>
-              <a:rPr lang="en-US" sz="1200"/>
+              <a:rPr lang="en-US" sz="1200" dirty="0"/>
               <a:t>PS3-Data input</a:t>
             </a:r>
           </a:p>
           <a:p>
             <a:r>
-              <a:rPr lang="en-US" sz="1200"/>
+              <a:rPr lang="en-US" sz="1200" dirty="0"/>
               <a:t>from the Growth File</a:t>
             </a:r>
           </a:p>
@@ -13265,7 +13276,7 @@
         </p:nvSpPr>
         <p:spPr bwMode="auto">
           <a:xfrm>
-            <a:off x="5780944" y="4840016"/>
+            <a:off x="5780944" y="4497928"/>
             <a:ext cx="838200" cy="1261229"/>
           </a:xfrm>
           <a:prstGeom prst="flowChartOffpageConnector">
@@ -13325,7 +13336,7 @@
         </p:nvCxnSpPr>
         <p:spPr bwMode="auto">
           <a:xfrm>
-            <a:off x="4267377" y="2386659"/>
+            <a:off x="4267377" y="2044571"/>
             <a:ext cx="188677" cy="193167"/>
           </a:xfrm>
           <a:prstGeom prst="straightConnector1">
@@ -13355,7 +13366,7 @@
         </p:nvCxnSpPr>
         <p:spPr bwMode="auto">
           <a:xfrm flipH="1">
-            <a:off x="3718551" y="4964231"/>
+            <a:off x="3718551" y="4622143"/>
             <a:ext cx="737503" cy="761789"/>
           </a:xfrm>
           <a:prstGeom prst="straightConnector1">
@@ -13382,7 +13393,7 @@
         </p:nvSpPr>
         <p:spPr bwMode="auto">
           <a:xfrm>
-            <a:off x="286576" y="1761977"/>
+            <a:off x="286576" y="1419889"/>
             <a:ext cx="1143000" cy="646331"/>
           </a:xfrm>
           <a:prstGeom prst="homePlate">
@@ -13483,7 +13494,7 @@
         </p:nvSpPr>
         <p:spPr bwMode="auto">
           <a:xfrm>
-            <a:off x="4087302" y="4864241"/>
+            <a:off x="4087302" y="4522153"/>
             <a:ext cx="381000" cy="276999"/>
           </a:xfrm>
           <a:prstGeom prst="rect">
@@ -13525,7 +13536,7 @@
         </p:nvSpPr>
         <p:spPr bwMode="auto">
           <a:xfrm>
-            <a:off x="3259255" y="2579826"/>
+            <a:off x="3259255" y="2237738"/>
             <a:ext cx="2393598" cy="2384405"/>
           </a:xfrm>
           <a:prstGeom prst="flowChartDecision">
@@ -13573,7 +13584,7 @@
         </p:nvCxnSpPr>
         <p:spPr bwMode="auto">
           <a:xfrm>
-            <a:off x="5652853" y="3772029"/>
+            <a:off x="5652853" y="3429941"/>
             <a:ext cx="547191" cy="1067987"/>
           </a:xfrm>
           <a:prstGeom prst="straightConnector1">
@@ -13602,7 +13613,7 @@
         </p:nvSpPr>
         <p:spPr bwMode="auto">
           <a:xfrm>
-            <a:off x="4265554" y="2324219"/>
+            <a:off x="4265554" y="1982131"/>
             <a:ext cx="533400" cy="276999"/>
           </a:xfrm>
           <a:prstGeom prst="rect">
@@ -13644,7 +13655,7 @@
         </p:nvSpPr>
         <p:spPr bwMode="auto">
           <a:xfrm>
-            <a:off x="5595703" y="3665944"/>
+            <a:off x="5595703" y="3323856"/>
             <a:ext cx="533400" cy="276999"/>
           </a:xfrm>
           <a:prstGeom prst="rect">
@@ -13686,7 +13697,7 @@
         </p:nvSpPr>
         <p:spPr bwMode="auto">
           <a:xfrm>
-            <a:off x="388797" y="3828476"/>
+            <a:off x="388797" y="3486388"/>
             <a:ext cx="1447800" cy="1015663"/>
           </a:xfrm>
           <a:prstGeom prst="flowChartProcess">
@@ -13726,7 +13737,7 @@
         </p:nvSpPr>
         <p:spPr bwMode="auto">
           <a:xfrm>
-            <a:off x="3171360" y="5215242"/>
+            <a:off x="3171360" y="4873154"/>
             <a:ext cx="1094381" cy="510778"/>
           </a:xfrm>
           <a:prstGeom prst="flowChartAlternateProcess">
@@ -13777,7 +13788,7 @@
         </p:nvSpPr>
         <p:spPr bwMode="auto">
           <a:xfrm>
-            <a:off x="276878" y="5240677"/>
+            <a:off x="276878" y="4898589"/>
             <a:ext cx="1671638" cy="1569660"/>
           </a:xfrm>
           <a:prstGeom prst="rect">
@@ -13840,7 +13851,7 @@
         </p:nvSpPr>
         <p:spPr bwMode="auto">
           <a:xfrm>
-            <a:off x="391972" y="7307298"/>
+            <a:off x="391972" y="6965210"/>
             <a:ext cx="1441450" cy="1015663"/>
           </a:xfrm>
           <a:prstGeom prst="rect">
@@ -13891,7 +13902,7 @@
         </p:nvSpPr>
         <p:spPr bwMode="auto">
           <a:xfrm>
-            <a:off x="2075343" y="1561288"/>
+            <a:off x="2075343" y="1219200"/>
             <a:ext cx="2192034" cy="1650742"/>
           </a:xfrm>
           <a:prstGeom prst="flowChartDecision">
@@ -13939,7 +13950,7 @@
         </p:nvCxnSpPr>
         <p:spPr bwMode="auto">
           <a:xfrm>
-            <a:off x="1429576" y="2085143"/>
+            <a:off x="1429576" y="1743055"/>
             <a:ext cx="645767" cy="301516"/>
           </a:xfrm>
           <a:prstGeom prst="straightConnector1">
@@ -13969,7 +13980,7 @@
         </p:nvCxnSpPr>
         <p:spPr bwMode="auto">
           <a:xfrm flipH="1">
-            <a:off x="1112697" y="3212030"/>
+            <a:off x="1112697" y="2869942"/>
             <a:ext cx="2058663" cy="616446"/>
           </a:xfrm>
           <a:prstGeom prst="straightConnector1">
@@ -13999,7 +14010,7 @@
         </p:nvCxnSpPr>
         <p:spPr bwMode="auto">
           <a:xfrm>
-            <a:off x="1112697" y="4844139"/>
+            <a:off x="1112697" y="4502051"/>
             <a:ext cx="0" cy="396538"/>
           </a:xfrm>
           <a:prstGeom prst="straightConnector1">
@@ -14029,7 +14040,7 @@
         </p:nvCxnSpPr>
         <p:spPr bwMode="auto">
           <a:xfrm>
-            <a:off x="1112697" y="6810337"/>
+            <a:off x="1112697" y="6468249"/>
             <a:ext cx="0" cy="496961"/>
           </a:xfrm>
           <a:prstGeom prst="straightConnector1">
@@ -14058,7 +14069,7 @@
         </p:nvCxnSpPr>
         <p:spPr bwMode="auto">
           <a:xfrm>
-            <a:off x="1833422" y="7815130"/>
+            <a:off x="1833422" y="7473042"/>
             <a:ext cx="893226" cy="0"/>
           </a:xfrm>
           <a:prstGeom prst="straightConnector1">
@@ -14138,7 +14149,7 @@
         </p:nvSpPr>
         <p:spPr bwMode="auto">
           <a:xfrm>
-            <a:off x="2521564" y="3000803"/>
+            <a:off x="2521564" y="2658715"/>
             <a:ext cx="381000" cy="276999"/>
           </a:xfrm>
           <a:prstGeom prst="rect">
@@ -14181,7 +14192,7 @@
         </p:nvCxnSpPr>
         <p:spPr bwMode="auto">
           <a:xfrm>
-            <a:off x="3718551" y="5726020"/>
+            <a:off x="3718551" y="5383932"/>
             <a:ext cx="13603" cy="354020"/>
           </a:xfrm>
           <a:prstGeom prst="straightConnector1">
@@ -14208,7 +14219,7 @@
         </p:nvSpPr>
         <p:spPr bwMode="auto">
           <a:xfrm>
-            <a:off x="3008254" y="6080040"/>
+            <a:off x="3008254" y="5737952"/>
             <a:ext cx="1447800" cy="573286"/>
           </a:xfrm>
           <a:prstGeom prst="flowChartOffpageConnector">
@@ -14282,7 +14293,7 @@
         </p:nvSpPr>
         <p:spPr bwMode="auto">
           <a:xfrm rot="16200000">
-            <a:off x="3031521" y="7139395"/>
+            <a:off x="3031521" y="6797307"/>
             <a:ext cx="738664" cy="1348407"/>
           </a:xfrm>
           <a:prstGeom prst="flowChartOffpageConnector">
@@ -17396,7 +17407,7 @@
               <a:pPr/>
               <a:t>8</a:t>
             </a:fld>
-            <a:endParaRPr lang="en-US" smtClean="0"/>
+            <a:endParaRPr lang="en-US" dirty="0" smtClean="0"/>
           </a:p>
         </p:txBody>
       </p:sp>
@@ -17582,7 +17593,7 @@
         </p:nvSpPr>
         <p:spPr bwMode="auto">
           <a:xfrm>
-            <a:off x="152400" y="7224832"/>
+            <a:off x="0" y="7010400"/>
             <a:ext cx="2971800" cy="1283910"/>
           </a:xfrm>
           <a:prstGeom prst="flowChartDecision">
@@ -17708,7 +17719,7 @@
         </p:nvSpPr>
         <p:spPr bwMode="auto">
           <a:xfrm>
-            <a:off x="3946446" y="6248400"/>
+            <a:off x="3962400" y="6096000"/>
             <a:ext cx="1692354" cy="1283910"/>
           </a:xfrm>
           <a:prstGeom prst="flowChartDecision">
@@ -17814,7 +17825,7 @@
         </p:nvSpPr>
         <p:spPr bwMode="auto">
           <a:xfrm>
-            <a:off x="2895600" y="7467600"/>
+            <a:off x="2895600" y="7239000"/>
             <a:ext cx="457200" cy="244475"/>
           </a:xfrm>
           <a:prstGeom prst="rect">
@@ -17856,7 +17867,7 @@
         </p:nvSpPr>
         <p:spPr bwMode="auto">
           <a:xfrm>
-            <a:off x="1676400" y="8534400"/>
+            <a:off x="1676400" y="8289925"/>
             <a:ext cx="381000" cy="244475"/>
           </a:xfrm>
           <a:prstGeom prst="rect">
@@ -18028,7 +18039,7 @@
         </p:nvSpPr>
         <p:spPr bwMode="auto">
           <a:xfrm>
-            <a:off x="4343400" y="7924800"/>
+            <a:off x="4343400" y="7543800"/>
             <a:ext cx="1524000" cy="715089"/>
           </a:xfrm>
           <a:prstGeom prst="flowChartAlternateProcess">
@@ -18457,7 +18468,7 @@
         <p:spPr bwMode="auto">
           <a:xfrm>
             <a:off x="1467882" y="6855262"/>
-            <a:ext cx="170418" cy="369570"/>
+            <a:ext cx="18018" cy="155138"/>
           </a:xfrm>
           <a:prstGeom prst="straightConnector1">
             <a:avLst/>
@@ -18485,13 +18496,13 @@
           <p:nvPr/>
         </p:nvCxnSpPr>
         <p:spPr bwMode="auto">
-          <a:xfrm rot="16200000" flipH="1">
-            <a:off x="3306277" y="6840765"/>
-            <a:ext cx="131147" cy="3467100"/>
+          <a:xfrm rot="5400000" flipH="1" flipV="1">
+            <a:off x="3277939" y="6466850"/>
+            <a:ext cx="35421" cy="3619500"/>
           </a:xfrm>
           <a:prstGeom prst="bentConnector3">
             <a:avLst>
-              <a:gd name="adj1" fmla="val 274308"/>
+              <a:gd name="adj1" fmla="val -645380"/>
             </a:avLst>
           </a:prstGeom>
           <a:noFill/>
@@ -18518,8 +18529,8 @@
         </p:nvCxnSpPr>
         <p:spPr bwMode="auto">
           <a:xfrm flipH="1" flipV="1">
-            <a:off x="4792623" y="7532310"/>
-            <a:ext cx="312777" cy="392490"/>
+            <a:off x="4808577" y="7379910"/>
+            <a:ext cx="296823" cy="163890"/>
           </a:xfrm>
           <a:prstGeom prst="straightConnector1">
             <a:avLst/>
@@ -18547,9 +18558,9 @@
           <p:nvPr/>
         </p:nvCxnSpPr>
         <p:spPr bwMode="auto">
-          <a:xfrm flipV="1">
-            <a:off x="5638800" y="6886307"/>
-            <a:ext cx="152400" cy="4048"/>
+          <a:xfrm>
+            <a:off x="5654754" y="6737955"/>
+            <a:ext cx="136446" cy="148352"/>
           </a:xfrm>
           <a:prstGeom prst="straightConnector1">
             <a:avLst/>
@@ -18578,8 +18589,8 @@
         </p:nvCxnSpPr>
         <p:spPr bwMode="auto">
           <a:xfrm flipV="1">
-            <a:off x="4792623" y="5819299"/>
-            <a:ext cx="103227" cy="429101"/>
+            <a:off x="4808577" y="5819299"/>
+            <a:ext cx="87273" cy="276701"/>
           </a:xfrm>
           <a:prstGeom prst="straightConnector1">
             <a:avLst/>
@@ -18668,8 +18679,8 @@
         </p:nvCxnSpPr>
         <p:spPr bwMode="auto">
           <a:xfrm flipV="1">
-            <a:off x="3124200" y="6890355"/>
-            <a:ext cx="822246" cy="976432"/>
+            <a:off x="2971800" y="6737955"/>
+            <a:ext cx="990600" cy="914400"/>
           </a:xfrm>
           <a:prstGeom prst="straightConnector1">
             <a:avLst/>
@@ -18838,7 +18849,7 @@
         </p:nvSpPr>
         <p:spPr bwMode="auto">
           <a:xfrm>
-            <a:off x="1790700" y="264914"/>
+            <a:off x="1790700" y="281943"/>
             <a:ext cx="914400" cy="1261229"/>
           </a:xfrm>
           <a:prstGeom prst="flowChartOffpageConnector">
@@ -18884,7 +18895,7 @@
         </p:nvSpPr>
         <p:spPr bwMode="auto">
           <a:xfrm>
-            <a:off x="935038" y="1897380"/>
+            <a:off x="935038" y="1914409"/>
             <a:ext cx="2625725" cy="1015663"/>
           </a:xfrm>
           <a:prstGeom prst="flowChartProcess">
@@ -18946,7 +18957,7 @@
         </p:nvSpPr>
         <p:spPr bwMode="auto">
           <a:xfrm>
-            <a:off x="935038" y="3449181"/>
+            <a:off x="935038" y="3466210"/>
             <a:ext cx="2625725" cy="1200329"/>
           </a:xfrm>
           <a:prstGeom prst="rect">
@@ -18999,7 +19010,7 @@
         </p:nvCxnSpPr>
         <p:spPr bwMode="auto">
           <a:xfrm>
-            <a:off x="2247900" y="1526143"/>
+            <a:off x="2247900" y="1543172"/>
             <a:ext cx="1" cy="371237"/>
           </a:xfrm>
           <a:prstGeom prst="straightConnector1">
@@ -19029,7 +19040,7 @@
         </p:nvCxnSpPr>
         <p:spPr bwMode="auto">
           <a:xfrm>
-            <a:off x="2247901" y="2913043"/>
+            <a:off x="2247901" y="2930072"/>
             <a:ext cx="0" cy="536138"/>
           </a:xfrm>
           <a:prstGeom prst="straightConnector1">
@@ -19059,8 +19070,8 @@
         </p:nvCxnSpPr>
         <p:spPr bwMode="auto">
           <a:xfrm flipH="1">
-            <a:off x="2247900" y="4649510"/>
-            <a:ext cx="1" cy="534012"/>
+            <a:off x="2247900" y="4666539"/>
+            <a:ext cx="1" cy="718053"/>
           </a:xfrm>
           <a:prstGeom prst="straightConnector1">
             <a:avLst/>
@@ -19088,8 +19099,8 @@
         </p:nvSpPr>
         <p:spPr bwMode="auto">
           <a:xfrm>
-            <a:off x="457200" y="4984144"/>
-            <a:ext cx="3581400" cy="1595021"/>
+            <a:off x="457200" y="5246561"/>
+            <a:ext cx="3581400" cy="1104245"/>
           </a:xfrm>
           <a:prstGeom prst="horizontalScroll">
             <a:avLst>
@@ -19124,7 +19135,15 @@
             </a:r>
             <a:r>
               <a:rPr lang="en-US" sz="1200" dirty="0"/>
-              <a:t>report for the SIPs and output a database (ORL, NIF, or similar) that can be used for AQ modeling purposes.  Reports need significant detail to allow review of the results from application of transport and other state caps.</a:t>
+              <a:t>report for the </a:t>
+            </a:r>
+            <a:r>
+              <a:rPr lang="en-US" sz="1200" dirty="0" smtClean="0"/>
+              <a:t>SIPs.  </a:t>
+            </a:r>
+            <a:r>
+              <a:rPr lang="en-US" sz="1200" dirty="0"/>
+              <a:t>Reports need significant detail to allow review of the results from application of transport and other state caps.</a:t>
             </a:r>
           </a:p>
         </p:txBody>
@@ -19137,7 +19156,7 @@
         </p:nvSpPr>
         <p:spPr bwMode="auto">
           <a:xfrm>
-            <a:off x="1524000" y="6877285"/>
+            <a:off x="1524000" y="6894314"/>
             <a:ext cx="1447800" cy="573286"/>
           </a:xfrm>
           <a:prstGeom prst="flowChartOffpageConnector">
@@ -19212,8 +19231,8 @@
         </p:nvCxnSpPr>
         <p:spPr bwMode="auto">
           <a:xfrm>
-            <a:off x="2247900" y="6379787"/>
-            <a:ext cx="0" cy="497498"/>
+            <a:off x="2247900" y="6212775"/>
+            <a:ext cx="0" cy="681539"/>
           </a:xfrm>
           <a:prstGeom prst="straightConnector1">
             <a:avLst/>

</xml_diff>